<commit_message>
Modified to PPT slides 15,16,21 and 24
</commit_message>
<xml_diff>
--- a/What Makes the World Happy.pptx
+++ b/What Makes the World Happy.pptx
@@ -220,7 +220,7 @@
           <a:p>
             <a:fld id="{503B2ACC-A628-475F-AC4B-C987AC91FD6D}" type="datetimeFigureOut">
               <a:rPr lang="en-US" smtClean="0"/>
-              <a:t>7/27/2019</a:t>
+              <a:t>7/28/2019</a:t>
             </a:fld>
             <a:endParaRPr lang="en-US"/>
           </a:p>
@@ -11076,31 +11076,38 @@
           </a:p>
         </p:txBody>
       </p:sp>
-      <p:sp>
-        <p:nvSpPr>
-          <p:cNvPr id="3" name="Content Placeholder 2">
+      <p:pic>
+        <p:nvPicPr>
+          <p:cNvPr id="6" name="Content Placeholder 5">
             <a:extLst>
               <a:ext uri="{FF2B5EF4-FFF2-40B4-BE49-F238E27FC236}">
-                <a16:creationId xmlns:a16="http://schemas.microsoft.com/office/drawing/2014/main" id="{6EB76005-FE48-4FAC-84C4-A22B94BAF6B9}"/>
+                <a16:creationId xmlns:a16="http://schemas.microsoft.com/office/drawing/2014/main" id="{A29C5335-1013-418A-83DF-239814F88866}"/>
               </a:ext>
             </a:extLst>
           </p:cNvPr>
-          <p:cNvSpPr>
-            <a:spLocks noGrp="1"/>
-          </p:cNvSpPr>
+          <p:cNvPicPr>
+            <a:picLocks noGrp="1" noChangeAspect="1"/>
+          </p:cNvPicPr>
           <p:nvPr>
             <p:ph idx="1"/>
           </p:nvPr>
-        </p:nvSpPr>
-        <p:spPr/>
-        <p:txBody>
-          <a:bodyPr/>
-          <a:lstStyle/>
-          <a:p>
-            <a:endParaRPr lang="en-US" dirty="0"/>
-          </a:p>
-        </p:txBody>
-      </p:sp>
+        </p:nvPicPr>
+        <p:blipFill>
+          <a:blip r:embed="rId2"/>
+          <a:stretch>
+            <a:fillRect/>
+          </a:stretch>
+        </p:blipFill>
+        <p:spPr>
+          <a:xfrm>
+            <a:off x="904524" y="2014537"/>
+            <a:ext cx="3762375" cy="2828925"/>
+          </a:xfrm>
+          <a:prstGeom prst="rect">
+            <a:avLst/>
+          </a:prstGeom>
+        </p:spPr>
+      </p:pic>
       <p:sp>
         <p:nvSpPr>
           <p:cNvPr id="4" name="Date Placeholder 3">
@@ -11157,6 +11164,135 @@
               <a:t>15</a:t>
             </a:fld>
             <a:endParaRPr lang="en-US" dirty="0"/>
+          </a:p>
+        </p:txBody>
+      </p:sp>
+      <p:sp>
+        <p:nvSpPr>
+          <p:cNvPr id="7" name="TextBox 6">
+            <a:extLst>
+              <a:ext uri="{FF2B5EF4-FFF2-40B4-BE49-F238E27FC236}">
+                <a16:creationId xmlns:a16="http://schemas.microsoft.com/office/drawing/2014/main" id="{302B33BF-3245-4472-B8F2-CE000DB5BC22}"/>
+              </a:ext>
+            </a:extLst>
+          </p:cNvPr>
+          <p:cNvSpPr txBox="1"/>
+          <p:nvPr/>
+        </p:nvSpPr>
+        <p:spPr>
+          <a:xfrm>
+            <a:off x="1329070" y="4927598"/>
+            <a:ext cx="1988288" cy="369332"/>
+          </a:xfrm>
+          <a:prstGeom prst="rect">
+            <a:avLst/>
+          </a:prstGeom>
+          <a:noFill/>
+        </p:spPr>
+        <p:txBody>
+          <a:bodyPr wrap="square" rtlCol="0">
+            <a:spAutoFit/>
+          </a:bodyPr>
+          <a:lstStyle/>
+          <a:p>
+            <a:r>
+              <a:rPr lang="en-US" dirty="0">
+                <a:solidFill>
+                  <a:schemeClr val="tx1">
+                    <a:lumMod val="75000"/>
+                    <a:lumOff val="25000"/>
+                  </a:schemeClr>
+                </a:solidFill>
+              </a:rPr>
+              <a:t>r value: 0.3518</a:t>
+            </a:r>
+          </a:p>
+        </p:txBody>
+      </p:sp>
+      <p:sp>
+        <p:nvSpPr>
+          <p:cNvPr id="10" name="TextBox 9">
+            <a:extLst>
+              <a:ext uri="{FF2B5EF4-FFF2-40B4-BE49-F238E27FC236}">
+                <a16:creationId xmlns:a16="http://schemas.microsoft.com/office/drawing/2014/main" id="{03110C20-0CF7-4E19-B94A-FAFFDE63F0E0}"/>
+              </a:ext>
+            </a:extLst>
+          </p:cNvPr>
+          <p:cNvSpPr txBox="1"/>
+          <p:nvPr/>
+        </p:nvSpPr>
+        <p:spPr>
+          <a:xfrm>
+            <a:off x="4975668" y="2153330"/>
+            <a:ext cx="5327281" cy="2308324"/>
+          </a:xfrm>
+          <a:prstGeom prst="rect">
+            <a:avLst/>
+          </a:prstGeom>
+          <a:noFill/>
+        </p:spPr>
+        <p:txBody>
+          <a:bodyPr wrap="square" rtlCol="0">
+            <a:spAutoFit/>
+          </a:bodyPr>
+          <a:lstStyle/>
+          <a:p>
+            <a:r>
+              <a:rPr lang="en-US" sz="1600" dirty="0">
+                <a:solidFill>
+                  <a:schemeClr val="tx1">
+                    <a:lumMod val="65000"/>
+                    <a:lumOff val="35000"/>
+                  </a:schemeClr>
+                </a:solidFill>
+              </a:rPr>
+              <a:t>Surprisingly, alcohol consumption has a positive correlation with happiness Index. Alcohol consumption has always been linked to be used to numb pain and despair. Also, linked to crime, violence, accidents and death.</a:t>
+            </a:r>
+          </a:p>
+          <a:p>
+            <a:endParaRPr lang="en-US" sz="1600" dirty="0">
+              <a:solidFill>
+                <a:schemeClr val="tx1">
+                  <a:lumMod val="65000"/>
+                  <a:lumOff val="35000"/>
+                </a:schemeClr>
+              </a:solidFill>
+            </a:endParaRPr>
+          </a:p>
+          <a:p>
+            <a:r>
+              <a:rPr lang="en-US" sz="1600" dirty="0">
+                <a:solidFill>
+                  <a:schemeClr val="tx1">
+                    <a:lumMod val="65000"/>
+                    <a:lumOff val="35000"/>
+                  </a:schemeClr>
+                </a:solidFill>
+              </a:rPr>
+              <a:t>However, in this graph we can see that residents of happy countries </a:t>
+            </a:r>
+            <a:r>
+              <a:rPr lang="en-US" sz="1600" i="1" u="sng" dirty="0">
+                <a:solidFill>
+                  <a:schemeClr val="tx1">
+                    <a:lumMod val="65000"/>
+                    <a:lumOff val="35000"/>
+                  </a:schemeClr>
+                </a:solidFill>
+              </a:rPr>
+              <a:t>probably</a:t>
+            </a:r>
+            <a:r>
+              <a:rPr lang="en-US" sz="1600" dirty="0">
+                <a:solidFill>
+                  <a:schemeClr val="tx1">
+                    <a:lumMod val="65000"/>
+                    <a:lumOff val="35000"/>
+                  </a:schemeClr>
+                </a:solidFill>
+              </a:rPr>
+              <a:t> consume alcohol for reasons like pleasure, indulgence and celebration.</a:t>
+            </a:r>
           </a:p>
         </p:txBody>
       </p:sp>
@@ -11227,31 +11363,38 @@
           </a:p>
         </p:txBody>
       </p:sp>
-      <p:sp>
-        <p:nvSpPr>
-          <p:cNvPr id="3" name="Content Placeholder 2">
+      <p:pic>
+        <p:nvPicPr>
+          <p:cNvPr id="6" name="Content Placeholder 5">
             <a:extLst>
               <a:ext uri="{FF2B5EF4-FFF2-40B4-BE49-F238E27FC236}">
-                <a16:creationId xmlns:a16="http://schemas.microsoft.com/office/drawing/2014/main" id="{6EB76005-FE48-4FAC-84C4-A22B94BAF6B9}"/>
+                <a16:creationId xmlns:a16="http://schemas.microsoft.com/office/drawing/2014/main" id="{22A86572-9D15-4649-9363-6B5A6CE88C1E}"/>
               </a:ext>
             </a:extLst>
           </p:cNvPr>
-          <p:cNvSpPr>
-            <a:spLocks noGrp="1"/>
-          </p:cNvSpPr>
+          <p:cNvPicPr>
+            <a:picLocks noGrp="1" noChangeAspect="1"/>
+          </p:cNvPicPr>
           <p:nvPr>
             <p:ph idx="1"/>
           </p:nvPr>
-        </p:nvSpPr>
-        <p:spPr/>
-        <p:txBody>
-          <a:bodyPr/>
-          <a:lstStyle/>
-          <a:p>
-            <a:endParaRPr lang="en-US" dirty="0"/>
-          </a:p>
-        </p:txBody>
-      </p:sp>
+        </p:nvPicPr>
+        <p:blipFill>
+          <a:blip r:embed="rId2"/>
+          <a:stretch>
+            <a:fillRect/>
+          </a:stretch>
+        </p:blipFill>
+        <p:spPr>
+          <a:xfrm>
+            <a:off x="818799" y="1930400"/>
+            <a:ext cx="4355085" cy="3015870"/>
+          </a:xfrm>
+          <a:prstGeom prst="rect">
+            <a:avLst/>
+          </a:prstGeom>
+        </p:spPr>
+      </p:pic>
       <p:sp>
         <p:nvSpPr>
           <p:cNvPr id="4" name="Date Placeholder 3">
@@ -11308,6 +11451,146 @@
               <a:t>16</a:t>
             </a:fld>
             <a:endParaRPr lang="en-US" dirty="0"/>
+          </a:p>
+        </p:txBody>
+      </p:sp>
+      <p:sp>
+        <p:nvSpPr>
+          <p:cNvPr id="8" name="TextBox 7">
+            <a:extLst>
+              <a:ext uri="{FF2B5EF4-FFF2-40B4-BE49-F238E27FC236}">
+                <a16:creationId xmlns:a16="http://schemas.microsoft.com/office/drawing/2014/main" id="{155BA9C9-610E-42F6-8214-B5BCD78C971D}"/>
+              </a:ext>
+            </a:extLst>
+          </p:cNvPr>
+          <p:cNvSpPr txBox="1"/>
+          <p:nvPr/>
+        </p:nvSpPr>
+        <p:spPr>
+          <a:xfrm>
+            <a:off x="4975668" y="2153330"/>
+            <a:ext cx="5327281" cy="2800767"/>
+          </a:xfrm>
+          <a:prstGeom prst="rect">
+            <a:avLst/>
+          </a:prstGeom>
+          <a:noFill/>
+        </p:spPr>
+        <p:txBody>
+          <a:bodyPr wrap="square" rtlCol="0">
+            <a:spAutoFit/>
+          </a:bodyPr>
+          <a:lstStyle/>
+          <a:p>
+            <a:r>
+              <a:rPr lang="en-US" sz="1600" dirty="0">
+                <a:solidFill>
+                  <a:schemeClr val="tx1">
+                    <a:lumMod val="65000"/>
+                    <a:lumOff val="35000"/>
+                  </a:schemeClr>
+                </a:solidFill>
+              </a:rPr>
+              <a:t>This analysis shows that happier nations have a higher Education index than unhappy ones with a strong correlation of 0.76. </a:t>
+            </a:r>
+          </a:p>
+          <a:p>
+            <a:endParaRPr lang="en-US" sz="1600" dirty="0">
+              <a:solidFill>
+                <a:schemeClr val="tx1">
+                  <a:lumMod val="65000"/>
+                  <a:lumOff val="35000"/>
+                </a:schemeClr>
+              </a:solidFill>
+            </a:endParaRPr>
+          </a:p>
+          <a:p>
+            <a:r>
+              <a:rPr lang="en-US" sz="1600" dirty="0">
+                <a:solidFill>
+                  <a:schemeClr val="tx1">
+                    <a:lumMod val="65000"/>
+                    <a:lumOff val="35000"/>
+                  </a:schemeClr>
+                </a:solidFill>
+              </a:rPr>
+              <a:t>We can assume that Education is linked to sense of individual empowerment, community contribution and better job conditions. </a:t>
+            </a:r>
+          </a:p>
+          <a:p>
+            <a:endParaRPr lang="en-US" sz="1600" dirty="0">
+              <a:solidFill>
+                <a:schemeClr val="tx1">
+                  <a:lumMod val="65000"/>
+                  <a:lumOff val="35000"/>
+                </a:schemeClr>
+              </a:solidFill>
+            </a:endParaRPr>
+          </a:p>
+          <a:p>
+            <a:r>
+              <a:rPr lang="en-US" sz="1600" dirty="0">
+                <a:solidFill>
+                  <a:schemeClr val="tx1">
+                    <a:lumMod val="65000"/>
+                    <a:lumOff val="35000"/>
+                  </a:schemeClr>
+                </a:solidFill>
+              </a:rPr>
+              <a:t>All of it contributing to country’s residents sense of security and well being. </a:t>
+            </a:r>
+          </a:p>
+          <a:p>
+            <a:endParaRPr lang="en-US" sz="1600" dirty="0">
+              <a:solidFill>
+                <a:schemeClr val="tx1">
+                  <a:lumMod val="65000"/>
+                  <a:lumOff val="35000"/>
+                </a:schemeClr>
+              </a:solidFill>
+            </a:endParaRPr>
+          </a:p>
+        </p:txBody>
+      </p:sp>
+      <p:sp>
+        <p:nvSpPr>
+          <p:cNvPr id="9" name="TextBox 8">
+            <a:extLst>
+              <a:ext uri="{FF2B5EF4-FFF2-40B4-BE49-F238E27FC236}">
+                <a16:creationId xmlns:a16="http://schemas.microsoft.com/office/drawing/2014/main" id="{1F7B5F28-4CFF-4EB9-A0F9-035416EA5B2E}"/>
+              </a:ext>
+            </a:extLst>
+          </p:cNvPr>
+          <p:cNvSpPr txBox="1"/>
+          <p:nvPr/>
+        </p:nvSpPr>
+        <p:spPr>
+          <a:xfrm>
+            <a:off x="1329070" y="4927598"/>
+            <a:ext cx="1988288" cy="369332"/>
+          </a:xfrm>
+          <a:prstGeom prst="rect">
+            <a:avLst/>
+          </a:prstGeom>
+          <a:noFill/>
+        </p:spPr>
+        <p:txBody>
+          <a:bodyPr wrap="square" rtlCol="0">
+            <a:spAutoFit/>
+          </a:bodyPr>
+          <a:lstStyle/>
+          <a:p>
+            <a:r>
+              <a:rPr lang="en-US" dirty="0">
+                <a:solidFill>
+                  <a:schemeClr val="tx1">
+                    <a:lumMod val="75000"/>
+                    <a:lumOff val="25000"/>
+                  </a:schemeClr>
+                </a:solidFill>
+              </a:rPr>
+              <a:t>r value: 0.7603</a:t>
+            </a:r>
           </a:p>
         </p:txBody>
       </p:sp>
@@ -11587,10 +11870,9 @@
           <a:lstStyle/>
           <a:p>
             <a:r>
-              <a:rPr lang="en-US"/>
+              <a:rPr lang="en-US" dirty="0"/>
               <a:t>7/29/2019</a:t>
             </a:r>
-            <a:endParaRPr lang="en-US" dirty="0"/>
           </a:p>
         </p:txBody>
       </p:sp>
@@ -12168,7 +12450,12 @@
             <p:ph type="title"/>
           </p:nvPr>
         </p:nvSpPr>
-        <p:spPr/>
+        <p:spPr>
+          <a:xfrm>
+            <a:off x="677334" y="241300"/>
+            <a:ext cx="8596668" cy="647700"/>
+          </a:xfrm>
+        </p:spPr>
         <p:txBody>
           <a:bodyPr/>
           <a:lstStyle/>
@@ -12196,15 +12483,312 @@
             <p:ph idx="1"/>
           </p:nvPr>
         </p:nvSpPr>
-        <p:spPr/>
-        <p:txBody>
-          <a:bodyPr/>
+        <p:spPr>
+          <a:xfrm>
+            <a:off x="798872" y="939799"/>
+            <a:ext cx="8596668" cy="5466687"/>
+          </a:xfrm>
+        </p:spPr>
+        <p:txBody>
+          <a:bodyPr>
+            <a:normAutofit fontScale="55000" lnSpcReduction="20000"/>
+          </a:bodyPr>
           <a:lstStyle/>
           <a:p>
             <a:r>
-              <a:rPr lang="en-US" dirty="0"/>
-              <a:t>Answer the questions that were asked at the beginning</a:t>
-            </a:r>
+              <a:rPr lang="en-US" sz="2900" dirty="0">
+                <a:solidFill>
+                  <a:schemeClr val="tx1">
+                    <a:lumMod val="65000"/>
+                    <a:lumOff val="35000"/>
+                  </a:schemeClr>
+                </a:solidFill>
+              </a:rPr>
+              <a:t>We can conclude that higher Happiness Index around the world is concentrated in Europe, The Americas and Oceania, leaving Africa and Asia with the lower scores.</a:t>
+            </a:r>
+          </a:p>
+          <a:p>
+            <a:pPr marL="0" indent="0">
+              <a:buNone/>
+            </a:pPr>
+            <a:endParaRPr lang="en-US" sz="2900" dirty="0">
+              <a:solidFill>
+                <a:schemeClr val="tx1">
+                  <a:lumMod val="65000"/>
+                  <a:lumOff val="35000"/>
+                </a:schemeClr>
+              </a:solidFill>
+            </a:endParaRPr>
+          </a:p>
+          <a:p>
+            <a:r>
+              <a:rPr lang="en-US" sz="2900" dirty="0">
+                <a:solidFill>
+                  <a:schemeClr val="tx1">
+                    <a:lumMod val="65000"/>
+                    <a:lumOff val="35000"/>
+                  </a:schemeClr>
+                </a:solidFill>
+              </a:rPr>
+              <a:t>Finland, Norway, Denmark, Iceland and Switzerland are the countries with the higher Happiness Index score in the world. And they have consistently ranked at this level for 2015 to 2018. </a:t>
+            </a:r>
+          </a:p>
+          <a:p>
+            <a:endParaRPr lang="en-US" sz="2900" dirty="0">
+              <a:solidFill>
+                <a:schemeClr val="tx1">
+                  <a:lumMod val="65000"/>
+                  <a:lumOff val="35000"/>
+                </a:schemeClr>
+              </a:solidFill>
+            </a:endParaRPr>
+          </a:p>
+          <a:p>
+            <a:r>
+              <a:rPr lang="en-US" sz="2900" dirty="0">
+                <a:solidFill>
+                  <a:schemeClr val="tx1">
+                    <a:lumMod val="65000"/>
+                    <a:lumOff val="35000"/>
+                  </a:schemeClr>
+                </a:solidFill>
+              </a:rPr>
+              <a:t>Factors with </a:t>
+            </a:r>
+            <a:r>
+              <a:rPr lang="en-US" sz="2900" b="1" dirty="0">
+                <a:solidFill>
+                  <a:schemeClr val="tx1">
+                    <a:lumMod val="65000"/>
+                    <a:lumOff val="35000"/>
+                  </a:schemeClr>
+                </a:solidFill>
+              </a:rPr>
+              <a:t>high correlation </a:t>
+            </a:r>
+            <a:r>
+              <a:rPr lang="en-US" sz="2900" dirty="0">
+                <a:solidFill>
+                  <a:schemeClr val="tx1">
+                    <a:lumMod val="65000"/>
+                    <a:lumOff val="35000"/>
+                  </a:schemeClr>
+                </a:solidFill>
+              </a:rPr>
+              <a:t>to country happiness index:</a:t>
+            </a:r>
+          </a:p>
+          <a:p>
+            <a:pPr lvl="1"/>
+            <a:r>
+              <a:rPr lang="en-US" sz="2900" dirty="0">
+                <a:solidFill>
+                  <a:schemeClr val="tx1">
+                    <a:lumMod val="65000"/>
+                    <a:lumOff val="35000"/>
+                  </a:schemeClr>
+                </a:solidFill>
+              </a:rPr>
+              <a:t>GDP, Education Level, Access to Internet, ??????</a:t>
+            </a:r>
+          </a:p>
+          <a:p>
+            <a:pPr lvl="1"/>
+            <a:endParaRPr lang="en-US" sz="2900" dirty="0">
+              <a:solidFill>
+                <a:schemeClr val="tx1">
+                  <a:lumMod val="65000"/>
+                  <a:lumOff val="35000"/>
+                </a:schemeClr>
+              </a:solidFill>
+            </a:endParaRPr>
+          </a:p>
+          <a:p>
+            <a:r>
+              <a:rPr lang="en-US" sz="2900" dirty="0">
+                <a:solidFill>
+                  <a:schemeClr val="tx1">
+                    <a:lumMod val="65000"/>
+                    <a:lumOff val="35000"/>
+                  </a:schemeClr>
+                </a:solidFill>
+              </a:rPr>
+              <a:t>Factors with </a:t>
+            </a:r>
+            <a:r>
+              <a:rPr lang="en-US" sz="2900" b="1" dirty="0">
+                <a:solidFill>
+                  <a:schemeClr val="tx1">
+                    <a:lumMod val="65000"/>
+                    <a:lumOff val="35000"/>
+                  </a:schemeClr>
+                </a:solidFill>
+              </a:rPr>
+              <a:t>some correlation </a:t>
+            </a:r>
+            <a:r>
+              <a:rPr lang="en-US" sz="2900" dirty="0">
+                <a:solidFill>
+                  <a:schemeClr val="tx1">
+                    <a:lumMod val="65000"/>
+                    <a:lumOff val="35000"/>
+                  </a:schemeClr>
+                </a:solidFill>
+              </a:rPr>
+              <a:t>to country happiness index:</a:t>
+            </a:r>
+          </a:p>
+          <a:p>
+            <a:pPr lvl="1"/>
+            <a:r>
+              <a:rPr lang="en-US" sz="2900" dirty="0">
+                <a:solidFill>
+                  <a:schemeClr val="tx1">
+                    <a:lumMod val="65000"/>
+                    <a:lumOff val="35000"/>
+                  </a:schemeClr>
+                </a:solidFill>
+              </a:rPr>
+              <a:t>Median age, Alcohol Consumption, Disaster Risk rate and Average Hours of Sleep</a:t>
+            </a:r>
+          </a:p>
+          <a:p>
+            <a:pPr marL="457200" lvl="1" indent="0">
+              <a:buNone/>
+            </a:pPr>
+            <a:endParaRPr lang="en-US" sz="2900" dirty="0">
+              <a:solidFill>
+                <a:schemeClr val="tx1">
+                  <a:lumMod val="65000"/>
+                  <a:lumOff val="35000"/>
+                </a:schemeClr>
+              </a:solidFill>
+            </a:endParaRPr>
+          </a:p>
+          <a:p>
+            <a:r>
+              <a:rPr lang="en-US" sz="2900" dirty="0">
+                <a:solidFill>
+                  <a:schemeClr val="tx1">
+                    <a:lumMod val="65000"/>
+                    <a:lumOff val="35000"/>
+                  </a:schemeClr>
+                </a:solidFill>
+              </a:rPr>
+              <a:t>Factors with </a:t>
+            </a:r>
+            <a:r>
+              <a:rPr lang="en-US" sz="2900" b="1" dirty="0">
+                <a:solidFill>
+                  <a:schemeClr val="tx1">
+                    <a:lumMod val="65000"/>
+                    <a:lumOff val="35000"/>
+                  </a:schemeClr>
+                </a:solidFill>
+              </a:rPr>
+              <a:t>negative correlation </a:t>
+            </a:r>
+            <a:r>
+              <a:rPr lang="en-US" sz="2900" dirty="0">
+                <a:solidFill>
+                  <a:schemeClr val="tx1">
+                    <a:lumMod val="65000"/>
+                    <a:lumOff val="35000"/>
+                  </a:schemeClr>
+                </a:solidFill>
+              </a:rPr>
+              <a:t>to country happiness index:</a:t>
+            </a:r>
+          </a:p>
+          <a:p>
+            <a:pPr lvl="1"/>
+            <a:r>
+              <a:rPr lang="en-US" sz="2900" dirty="0">
+                <a:solidFill>
+                  <a:schemeClr val="tx1">
+                    <a:lumMod val="65000"/>
+                    <a:lumOff val="35000"/>
+                  </a:schemeClr>
+                </a:solidFill>
+              </a:rPr>
+              <a:t>?????????</a:t>
+            </a:r>
+            <a:br>
+              <a:rPr lang="en-US" sz="2900" dirty="0">
+                <a:solidFill>
+                  <a:schemeClr val="tx1">
+                    <a:lumMod val="65000"/>
+                    <a:lumOff val="35000"/>
+                  </a:schemeClr>
+                </a:solidFill>
+              </a:rPr>
+            </a:br>
+            <a:r>
+              <a:rPr lang="en-US" sz="2900" dirty="0">
+                <a:solidFill>
+                  <a:schemeClr val="tx1">
+                    <a:lumMod val="65000"/>
+                    <a:lumOff val="35000"/>
+                  </a:schemeClr>
+                </a:solidFill>
+              </a:rPr>
+              <a:t>	</a:t>
+            </a:r>
+          </a:p>
+          <a:p>
+            <a:r>
+              <a:rPr lang="en-US" sz="2900" dirty="0">
+                <a:solidFill>
+                  <a:schemeClr val="tx1">
+                    <a:lumMod val="65000"/>
+                    <a:lumOff val="35000"/>
+                  </a:schemeClr>
+                </a:solidFill>
+              </a:rPr>
+              <a:t>Factors with </a:t>
+            </a:r>
+            <a:r>
+              <a:rPr lang="en-US" sz="2900" b="1" dirty="0">
+                <a:solidFill>
+                  <a:schemeClr val="tx1">
+                    <a:lumMod val="65000"/>
+                    <a:lumOff val="35000"/>
+                  </a:schemeClr>
+                </a:solidFill>
+              </a:rPr>
+              <a:t>no correlation </a:t>
+            </a:r>
+            <a:r>
+              <a:rPr lang="en-US" sz="2900" dirty="0">
+                <a:solidFill>
+                  <a:schemeClr val="tx1">
+                    <a:lumMod val="65000"/>
+                    <a:lumOff val="35000"/>
+                  </a:schemeClr>
+                </a:solidFill>
+              </a:rPr>
+              <a:t>to country happiness index:</a:t>
+            </a:r>
+          </a:p>
+          <a:p>
+            <a:pPr lvl="1"/>
+            <a:r>
+              <a:rPr lang="en-US" sz="2900" dirty="0">
+                <a:solidFill>
+                  <a:schemeClr val="tx1">
+                    <a:lumMod val="65000"/>
+                    <a:lumOff val="35000"/>
+                  </a:schemeClr>
+                </a:solidFill>
+              </a:rPr>
+              <a:t>????????, ????????</a:t>
+            </a:r>
+          </a:p>
+          <a:p>
+            <a:endParaRPr lang="en-US" dirty="0"/>
+          </a:p>
+          <a:p>
+            <a:endParaRPr lang="en-US" dirty="0"/>
           </a:p>
         </p:txBody>
       </p:sp>
@@ -12590,6 +13174,14 @@
 <file path=ppt/slides/slide24.xml><?xml version="1.0" encoding="utf-8"?>
 <p:sld xmlns:a="http://schemas.openxmlformats.org/drawingml/2006/main" xmlns:r="http://schemas.openxmlformats.org/officeDocument/2006/relationships" xmlns:p="http://schemas.openxmlformats.org/presentationml/2006/main">
   <p:cSld>
+    <p:bg>
+      <p:bgPr>
+        <a:solidFill>
+          <a:schemeClr val="bg1"/>
+        </a:solidFill>
+        <a:effectLst/>
+      </p:bgPr>
+    </p:bg>
     <p:spTree>
       <p:nvGrpSpPr>
         <p:cNvPr id="1" name=""/>
@@ -12604,6 +13196,703 @@
           <a:chExt cx="0" cy="0"/>
         </a:xfrm>
       </p:grpSpPr>
+      <p:grpSp>
+        <p:nvGrpSpPr>
+          <p:cNvPr id="42" name="Group 25">
+            <a:extLst>
+              <a:ext uri="{FF2B5EF4-FFF2-40B4-BE49-F238E27FC236}">
+                <a16:creationId xmlns:a16="http://schemas.microsoft.com/office/drawing/2014/main" id="{EBE86EA4-C4F1-4465-B306-7A2BC2285926}"/>
+              </a:ext>
+              <a:ext uri="{C183D7F6-B498-43B3-948B-1728B52AA6E4}">
+                <adec:decorative xmlns:adec="http://schemas.microsoft.com/office/drawing/2017/decorative" val="1"/>
+              </a:ext>
+            </a:extLst>
+          </p:cNvPr>
+          <p:cNvGrpSpPr>
+            <a:grpSpLocks noGrp="1" noUngrp="1" noRot="1" noChangeAspect="1" noMove="1" noResize="1"/>
+          </p:cNvGrpSpPr>
+          <p:nvPr>
+            <p:extLst>
+              <p:ext uri="{386F3935-93C4-4BCD-93E2-E3B085C9AB24}">
+                <p16:designElem xmlns:p16="http://schemas.microsoft.com/office/powerpoint/2015/main" val="1"/>
+              </p:ext>
+            </p:extLst>
+          </p:nvPr>
+        </p:nvGrpSpPr>
+        <p:grpSpPr>
+          <a:xfrm>
+            <a:off x="0" y="-8467"/>
+            <a:ext cx="12192000" cy="6866467"/>
+            <a:chOff x="0" y="-8467"/>
+            <a:chExt cx="12192000" cy="6866467"/>
+          </a:xfrm>
+        </p:grpSpPr>
+        <p:cxnSp>
+          <p:nvCxnSpPr>
+            <p:cNvPr id="27" name="Straight Connector 26">
+              <a:extLst>
+                <a:ext uri="{FF2B5EF4-FFF2-40B4-BE49-F238E27FC236}">
+                  <a16:creationId xmlns:a16="http://schemas.microsoft.com/office/drawing/2014/main" id="{A8279268-DB29-43BE-B57C-14977EACFDA0}"/>
+                </a:ext>
+                <a:ext uri="{C183D7F6-B498-43B3-948B-1728B52AA6E4}">
+                  <adec:decorative xmlns:adec="http://schemas.microsoft.com/office/drawing/2017/decorative" val="1"/>
+                </a:ext>
+              </a:extLst>
+            </p:cNvPr>
+            <p:cNvCxnSpPr/>
+            <p:nvPr>
+              <p:extLst>
+                <p:ext uri="{386F3935-93C4-4BCD-93E2-E3B085C9AB24}">
+                  <p16:designElem xmlns:p16="http://schemas.microsoft.com/office/powerpoint/2015/main" val="1"/>
+                </p:ext>
+              </p:extLst>
+            </p:nvPr>
+          </p:nvCxnSpPr>
+          <p:spPr>
+            <a:xfrm>
+              <a:off x="9371012" y="0"/>
+              <a:ext cx="1219200" cy="6858000"/>
+            </a:xfrm>
+            <a:prstGeom prst="line">
+              <a:avLst/>
+            </a:prstGeom>
+            <a:ln w="9525">
+              <a:solidFill>
+                <a:schemeClr val="bg1">
+                  <a:lumMod val="75000"/>
+                </a:schemeClr>
+              </a:solidFill>
+            </a:ln>
+          </p:spPr>
+          <p:style>
+            <a:lnRef idx="2">
+              <a:schemeClr val="accent1"/>
+            </a:lnRef>
+            <a:fillRef idx="0">
+              <a:schemeClr val="accent1"/>
+            </a:fillRef>
+            <a:effectRef idx="1">
+              <a:schemeClr val="accent1"/>
+            </a:effectRef>
+            <a:fontRef idx="minor">
+              <a:schemeClr val="tx1"/>
+            </a:fontRef>
+          </p:style>
+        </p:cxnSp>
+        <p:cxnSp>
+          <p:nvCxnSpPr>
+            <p:cNvPr id="28" name="Straight Connector 27">
+              <a:extLst>
+                <a:ext uri="{FF2B5EF4-FFF2-40B4-BE49-F238E27FC236}">
+                  <a16:creationId xmlns:a16="http://schemas.microsoft.com/office/drawing/2014/main" id="{C8FA53C0-C1EF-4611-BAB3-65EEB16AA30F}"/>
+                </a:ext>
+                <a:ext uri="{C183D7F6-B498-43B3-948B-1728B52AA6E4}">
+                  <adec:decorative xmlns:adec="http://schemas.microsoft.com/office/drawing/2017/decorative" val="1"/>
+                </a:ext>
+              </a:extLst>
+            </p:cNvPr>
+            <p:cNvCxnSpPr/>
+            <p:nvPr>
+              <p:extLst>
+                <p:ext uri="{386F3935-93C4-4BCD-93E2-E3B085C9AB24}">
+                  <p16:designElem xmlns:p16="http://schemas.microsoft.com/office/powerpoint/2015/main" val="1"/>
+                </p:ext>
+              </p:extLst>
+            </p:nvPr>
+          </p:nvCxnSpPr>
+          <p:spPr>
+            <a:xfrm flipH="1">
+              <a:off x="7425267" y="3681413"/>
+              <a:ext cx="4763558" cy="3176587"/>
+            </a:xfrm>
+            <a:prstGeom prst="line">
+              <a:avLst/>
+            </a:prstGeom>
+            <a:ln w="9525">
+              <a:solidFill>
+                <a:schemeClr val="bg1">
+                  <a:lumMod val="85000"/>
+                </a:schemeClr>
+              </a:solidFill>
+            </a:ln>
+          </p:spPr>
+          <p:style>
+            <a:lnRef idx="2">
+              <a:schemeClr val="accent1"/>
+            </a:lnRef>
+            <a:fillRef idx="0">
+              <a:schemeClr val="accent1"/>
+            </a:fillRef>
+            <a:effectRef idx="1">
+              <a:schemeClr val="accent1"/>
+            </a:effectRef>
+            <a:fontRef idx="minor">
+              <a:schemeClr val="tx1"/>
+            </a:fontRef>
+          </p:style>
+        </p:cxnSp>
+        <p:sp>
+          <p:nvSpPr>
+            <p:cNvPr id="29" name="Rectangle 23">
+              <a:extLst>
+                <a:ext uri="{FF2B5EF4-FFF2-40B4-BE49-F238E27FC236}">
+                  <a16:creationId xmlns:a16="http://schemas.microsoft.com/office/drawing/2014/main" id="{81CDACFC-DD8A-4CC0-B7FC-6030FC3536D9}"/>
+                </a:ext>
+                <a:ext uri="{C183D7F6-B498-43B3-948B-1728B52AA6E4}">
+                  <adec:decorative xmlns:adec="http://schemas.microsoft.com/office/drawing/2017/decorative" val="1"/>
+                </a:ext>
+              </a:extLst>
+            </p:cNvPr>
+            <p:cNvSpPr/>
+            <p:nvPr>
+              <p:extLst>
+                <p:ext uri="{386F3935-93C4-4BCD-93E2-E3B085C9AB24}">
+                  <p16:designElem xmlns:p16="http://schemas.microsoft.com/office/powerpoint/2015/main" val="1"/>
+                </p:ext>
+              </p:extLst>
+            </p:nvPr>
+          </p:nvSpPr>
+          <p:spPr>
+            <a:xfrm>
+              <a:off x="9181476" y="-8467"/>
+              <a:ext cx="3007349" cy="6866467"/>
+            </a:xfrm>
+            <a:custGeom>
+              <a:avLst/>
+              <a:gdLst/>
+              <a:ahLst/>
+              <a:cxnLst/>
+              <a:rect l="l" t="t" r="r" b="b"/>
+              <a:pathLst>
+                <a:path w="3007349" h="6866467">
+                  <a:moveTo>
+                    <a:pt x="2045532" y="0"/>
+                  </a:moveTo>
+                  <a:lnTo>
+                    <a:pt x="3007349" y="0"/>
+                  </a:lnTo>
+                  <a:lnTo>
+                    <a:pt x="3007349" y="6866467"/>
+                  </a:lnTo>
+                  <a:lnTo>
+                    <a:pt x="0" y="6866467"/>
+                  </a:lnTo>
+                  <a:lnTo>
+                    <a:pt x="2045532" y="0"/>
+                  </a:lnTo>
+                  <a:close/>
+                </a:path>
+              </a:pathLst>
+            </a:custGeom>
+            <a:solidFill>
+              <a:schemeClr val="accent1">
+                <a:alpha val="30000"/>
+              </a:schemeClr>
+            </a:solidFill>
+            <a:ln>
+              <a:noFill/>
+            </a:ln>
+            <a:effectLst/>
+          </p:spPr>
+          <p:style>
+            <a:lnRef idx="1">
+              <a:schemeClr val="accent1"/>
+            </a:lnRef>
+            <a:fillRef idx="3">
+              <a:schemeClr val="accent1"/>
+            </a:fillRef>
+            <a:effectRef idx="2">
+              <a:schemeClr val="accent1"/>
+            </a:effectRef>
+            <a:fontRef idx="minor">
+              <a:schemeClr val="lt1"/>
+            </a:fontRef>
+          </p:style>
+        </p:sp>
+        <p:sp>
+          <p:nvSpPr>
+            <p:cNvPr id="30" name="Rectangle 25">
+              <a:extLst>
+                <a:ext uri="{FF2B5EF4-FFF2-40B4-BE49-F238E27FC236}">
+                  <a16:creationId xmlns:a16="http://schemas.microsoft.com/office/drawing/2014/main" id="{0269F267-73D4-4CC3-BEC7-73335654DE73}"/>
+                </a:ext>
+                <a:ext uri="{C183D7F6-B498-43B3-948B-1728B52AA6E4}">
+                  <adec:decorative xmlns:adec="http://schemas.microsoft.com/office/drawing/2017/decorative" val="1"/>
+                </a:ext>
+              </a:extLst>
+            </p:cNvPr>
+            <p:cNvSpPr/>
+            <p:nvPr>
+              <p:extLst>
+                <p:ext uri="{386F3935-93C4-4BCD-93E2-E3B085C9AB24}">
+                  <p16:designElem xmlns:p16="http://schemas.microsoft.com/office/powerpoint/2015/main" val="1"/>
+                </p:ext>
+              </p:extLst>
+            </p:nvPr>
+          </p:nvSpPr>
+          <p:spPr>
+            <a:xfrm>
+              <a:off x="9603442" y="-8467"/>
+              <a:ext cx="2588558" cy="6866467"/>
+            </a:xfrm>
+            <a:custGeom>
+              <a:avLst/>
+              <a:gdLst/>
+              <a:ahLst/>
+              <a:cxnLst/>
+              <a:rect l="l" t="t" r="r" b="b"/>
+              <a:pathLst>
+                <a:path w="2573311" h="6866467">
+                  <a:moveTo>
+                    <a:pt x="0" y="0"/>
+                  </a:moveTo>
+                  <a:lnTo>
+                    <a:pt x="2573311" y="0"/>
+                  </a:lnTo>
+                  <a:lnTo>
+                    <a:pt x="2573311" y="6866467"/>
+                  </a:lnTo>
+                  <a:lnTo>
+                    <a:pt x="1202336" y="6866467"/>
+                  </a:lnTo>
+                  <a:lnTo>
+                    <a:pt x="0" y="0"/>
+                  </a:lnTo>
+                  <a:close/>
+                </a:path>
+              </a:pathLst>
+            </a:custGeom>
+            <a:solidFill>
+              <a:schemeClr val="accent1">
+                <a:alpha val="20000"/>
+              </a:schemeClr>
+            </a:solidFill>
+            <a:ln>
+              <a:noFill/>
+            </a:ln>
+            <a:effectLst/>
+          </p:spPr>
+          <p:style>
+            <a:lnRef idx="1">
+              <a:schemeClr val="accent1"/>
+            </a:lnRef>
+            <a:fillRef idx="3">
+              <a:schemeClr val="accent1"/>
+            </a:fillRef>
+            <a:effectRef idx="2">
+              <a:schemeClr val="accent1"/>
+            </a:effectRef>
+            <a:fontRef idx="minor">
+              <a:schemeClr val="lt1"/>
+            </a:fontRef>
+          </p:style>
+        </p:sp>
+        <p:sp>
+          <p:nvSpPr>
+            <p:cNvPr id="31" name="Isosceles Triangle 30">
+              <a:extLst>
+                <a:ext uri="{FF2B5EF4-FFF2-40B4-BE49-F238E27FC236}">
+                  <a16:creationId xmlns:a16="http://schemas.microsoft.com/office/drawing/2014/main" id="{DC48F13D-B2D7-4EB8-9CA7-59243637C8DE}"/>
+                </a:ext>
+                <a:ext uri="{C183D7F6-B498-43B3-948B-1728B52AA6E4}">
+                  <adec:decorative xmlns:adec="http://schemas.microsoft.com/office/drawing/2017/decorative" val="1"/>
+                </a:ext>
+              </a:extLst>
+            </p:cNvPr>
+            <p:cNvSpPr/>
+            <p:nvPr>
+              <p:extLst>
+                <p:ext uri="{386F3935-93C4-4BCD-93E2-E3B085C9AB24}">
+                  <p16:designElem xmlns:p16="http://schemas.microsoft.com/office/powerpoint/2015/main" val="1"/>
+                </p:ext>
+              </p:extLst>
+            </p:nvPr>
+          </p:nvSpPr>
+          <p:spPr>
+            <a:xfrm>
+              <a:off x="8932333" y="3048000"/>
+              <a:ext cx="3259667" cy="3810000"/>
+            </a:xfrm>
+            <a:prstGeom prst="triangle">
+              <a:avLst>
+                <a:gd name="adj" fmla="val 100000"/>
+              </a:avLst>
+            </a:prstGeom>
+            <a:solidFill>
+              <a:schemeClr val="accent2">
+                <a:alpha val="72000"/>
+              </a:schemeClr>
+            </a:solidFill>
+            <a:ln>
+              <a:noFill/>
+            </a:ln>
+            <a:effectLst/>
+          </p:spPr>
+          <p:style>
+            <a:lnRef idx="1">
+              <a:schemeClr val="accent1"/>
+            </a:lnRef>
+            <a:fillRef idx="3">
+              <a:schemeClr val="accent1"/>
+            </a:fillRef>
+            <a:effectRef idx="2">
+              <a:schemeClr val="accent1"/>
+            </a:effectRef>
+            <a:fontRef idx="minor">
+              <a:schemeClr val="lt1"/>
+            </a:fontRef>
+          </p:style>
+        </p:sp>
+        <p:sp>
+          <p:nvSpPr>
+            <p:cNvPr id="32" name="Rectangle 27">
+              <a:extLst>
+                <a:ext uri="{FF2B5EF4-FFF2-40B4-BE49-F238E27FC236}">
+                  <a16:creationId xmlns:a16="http://schemas.microsoft.com/office/drawing/2014/main" id="{A82405B3-5A67-4DA2-8EDA-7AB65A8B4506}"/>
+                </a:ext>
+                <a:ext uri="{C183D7F6-B498-43B3-948B-1728B52AA6E4}">
+                  <adec:decorative xmlns:adec="http://schemas.microsoft.com/office/drawing/2017/decorative" val="1"/>
+                </a:ext>
+              </a:extLst>
+            </p:cNvPr>
+            <p:cNvSpPr/>
+            <p:nvPr>
+              <p:extLst>
+                <p:ext uri="{386F3935-93C4-4BCD-93E2-E3B085C9AB24}">
+                  <p16:designElem xmlns:p16="http://schemas.microsoft.com/office/powerpoint/2015/main" val="1"/>
+                </p:ext>
+              </p:extLst>
+            </p:nvPr>
+          </p:nvSpPr>
+          <p:spPr>
+            <a:xfrm>
+              <a:off x="9334500" y="-8467"/>
+              <a:ext cx="2854326" cy="6866467"/>
+            </a:xfrm>
+            <a:custGeom>
+              <a:avLst/>
+              <a:gdLst/>
+              <a:ahLst/>
+              <a:cxnLst/>
+              <a:rect l="l" t="t" r="r" b="b"/>
+              <a:pathLst>
+                <a:path w="2858013" h="6866467">
+                  <a:moveTo>
+                    <a:pt x="0" y="0"/>
+                  </a:moveTo>
+                  <a:lnTo>
+                    <a:pt x="2858013" y="0"/>
+                  </a:lnTo>
+                  <a:lnTo>
+                    <a:pt x="2858013" y="6866467"/>
+                  </a:lnTo>
+                  <a:lnTo>
+                    <a:pt x="2473942" y="6866467"/>
+                  </a:lnTo>
+                  <a:lnTo>
+                    <a:pt x="0" y="0"/>
+                  </a:lnTo>
+                  <a:close/>
+                </a:path>
+              </a:pathLst>
+            </a:custGeom>
+            <a:solidFill>
+              <a:schemeClr val="accent2">
+                <a:lumMod val="75000"/>
+                <a:alpha val="70000"/>
+              </a:schemeClr>
+            </a:solidFill>
+            <a:ln>
+              <a:noFill/>
+            </a:ln>
+            <a:effectLst/>
+          </p:spPr>
+          <p:style>
+            <a:lnRef idx="1">
+              <a:schemeClr val="accent1"/>
+            </a:lnRef>
+            <a:fillRef idx="3">
+              <a:schemeClr val="accent1"/>
+            </a:fillRef>
+            <a:effectRef idx="2">
+              <a:schemeClr val="accent1"/>
+            </a:effectRef>
+            <a:fontRef idx="minor">
+              <a:schemeClr val="lt1"/>
+            </a:fontRef>
+          </p:style>
+        </p:sp>
+        <p:sp>
+          <p:nvSpPr>
+            <p:cNvPr id="33" name="Rectangle 28">
+              <a:extLst>
+                <a:ext uri="{FF2B5EF4-FFF2-40B4-BE49-F238E27FC236}">
+                  <a16:creationId xmlns:a16="http://schemas.microsoft.com/office/drawing/2014/main" id="{7508BC7B-3BD2-4D96-A46E-82988222AC2E}"/>
+                </a:ext>
+                <a:ext uri="{C183D7F6-B498-43B3-948B-1728B52AA6E4}">
+                  <adec:decorative xmlns:adec="http://schemas.microsoft.com/office/drawing/2017/decorative" val="1"/>
+                </a:ext>
+              </a:extLst>
+            </p:cNvPr>
+            <p:cNvSpPr/>
+            <p:nvPr>
+              <p:extLst>
+                <p:ext uri="{386F3935-93C4-4BCD-93E2-E3B085C9AB24}">
+                  <p16:designElem xmlns:p16="http://schemas.microsoft.com/office/powerpoint/2015/main" val="1"/>
+                </p:ext>
+              </p:extLst>
+            </p:nvPr>
+          </p:nvSpPr>
+          <p:spPr>
+            <a:xfrm>
+              <a:off x="10898730" y="-8467"/>
+              <a:ext cx="1290094" cy="6866467"/>
+            </a:xfrm>
+            <a:custGeom>
+              <a:avLst/>
+              <a:gdLst/>
+              <a:ahLst/>
+              <a:cxnLst/>
+              <a:rect l="l" t="t" r="r" b="b"/>
+              <a:pathLst>
+                <a:path w="1290094" h="6858000">
+                  <a:moveTo>
+                    <a:pt x="1019735" y="0"/>
+                  </a:moveTo>
+                  <a:lnTo>
+                    <a:pt x="1290094" y="0"/>
+                  </a:lnTo>
+                  <a:lnTo>
+                    <a:pt x="1290094" y="6858000"/>
+                  </a:lnTo>
+                  <a:lnTo>
+                    <a:pt x="0" y="6858000"/>
+                  </a:lnTo>
+                  <a:lnTo>
+                    <a:pt x="1019735" y="0"/>
+                  </a:lnTo>
+                  <a:close/>
+                </a:path>
+              </a:pathLst>
+            </a:custGeom>
+            <a:solidFill>
+              <a:schemeClr val="accent1">
+                <a:lumMod val="60000"/>
+                <a:lumOff val="40000"/>
+                <a:alpha val="70000"/>
+              </a:schemeClr>
+            </a:solidFill>
+            <a:ln>
+              <a:noFill/>
+            </a:ln>
+            <a:effectLst/>
+          </p:spPr>
+          <p:style>
+            <a:lnRef idx="1">
+              <a:schemeClr val="accent1"/>
+            </a:lnRef>
+            <a:fillRef idx="3">
+              <a:schemeClr val="accent1"/>
+            </a:fillRef>
+            <a:effectRef idx="2">
+              <a:schemeClr val="accent1"/>
+            </a:effectRef>
+            <a:fontRef idx="minor">
+              <a:schemeClr val="lt1"/>
+            </a:fontRef>
+          </p:style>
+        </p:sp>
+        <p:sp>
+          <p:nvSpPr>
+            <p:cNvPr id="34" name="Rectangle 29">
+              <a:extLst>
+                <a:ext uri="{FF2B5EF4-FFF2-40B4-BE49-F238E27FC236}">
+                  <a16:creationId xmlns:a16="http://schemas.microsoft.com/office/drawing/2014/main" id="{4298D07C-2287-4B93-9041-935144DE1BD0}"/>
+                </a:ext>
+                <a:ext uri="{C183D7F6-B498-43B3-948B-1728B52AA6E4}">
+                  <adec:decorative xmlns:adec="http://schemas.microsoft.com/office/drawing/2017/decorative" val="1"/>
+                </a:ext>
+              </a:extLst>
+            </p:cNvPr>
+            <p:cNvSpPr/>
+            <p:nvPr>
+              <p:extLst>
+                <p:ext uri="{386F3935-93C4-4BCD-93E2-E3B085C9AB24}">
+                  <p16:designElem xmlns:p16="http://schemas.microsoft.com/office/powerpoint/2015/main" val="1"/>
+                </p:ext>
+              </p:extLst>
+            </p:nvPr>
+          </p:nvSpPr>
+          <p:spPr>
+            <a:xfrm>
+              <a:off x="10938999" y="-8467"/>
+              <a:ext cx="1249825" cy="6866467"/>
+            </a:xfrm>
+            <a:custGeom>
+              <a:avLst/>
+              <a:gdLst/>
+              <a:ahLst/>
+              <a:cxnLst/>
+              <a:rect l="l" t="t" r="r" b="b"/>
+              <a:pathLst>
+                <a:path w="1249825" h="6858000">
+                  <a:moveTo>
+                    <a:pt x="0" y="0"/>
+                  </a:moveTo>
+                  <a:lnTo>
+                    <a:pt x="1249825" y="0"/>
+                  </a:lnTo>
+                  <a:lnTo>
+                    <a:pt x="1249825" y="6858000"/>
+                  </a:lnTo>
+                  <a:lnTo>
+                    <a:pt x="1109382" y="6858000"/>
+                  </a:lnTo>
+                  <a:lnTo>
+                    <a:pt x="0" y="0"/>
+                  </a:lnTo>
+                  <a:close/>
+                </a:path>
+              </a:pathLst>
+            </a:custGeom>
+            <a:solidFill>
+              <a:schemeClr val="accent1">
+                <a:alpha val="65000"/>
+              </a:schemeClr>
+            </a:solidFill>
+            <a:ln>
+              <a:noFill/>
+            </a:ln>
+            <a:effectLst/>
+          </p:spPr>
+          <p:style>
+            <a:lnRef idx="1">
+              <a:schemeClr val="accent1"/>
+            </a:lnRef>
+            <a:fillRef idx="3">
+              <a:schemeClr val="accent1"/>
+            </a:fillRef>
+            <a:effectRef idx="2">
+              <a:schemeClr val="accent1"/>
+            </a:effectRef>
+            <a:fontRef idx="minor">
+              <a:schemeClr val="lt1"/>
+            </a:fontRef>
+          </p:style>
+        </p:sp>
+        <p:sp>
+          <p:nvSpPr>
+            <p:cNvPr id="35" name="Isosceles Triangle 34">
+              <a:extLst>
+                <a:ext uri="{FF2B5EF4-FFF2-40B4-BE49-F238E27FC236}">
+                  <a16:creationId xmlns:a16="http://schemas.microsoft.com/office/drawing/2014/main" id="{0F6BC886-C125-4903-8C2A-6FB687400DD0}"/>
+                </a:ext>
+                <a:ext uri="{C183D7F6-B498-43B3-948B-1728B52AA6E4}">
+                  <adec:decorative xmlns:adec="http://schemas.microsoft.com/office/drawing/2017/decorative" val="1"/>
+                </a:ext>
+              </a:extLst>
+            </p:cNvPr>
+            <p:cNvSpPr/>
+            <p:nvPr>
+              <p:extLst>
+                <p:ext uri="{386F3935-93C4-4BCD-93E2-E3B085C9AB24}">
+                  <p16:designElem xmlns:p16="http://schemas.microsoft.com/office/powerpoint/2015/main" val="1"/>
+                </p:ext>
+              </p:extLst>
+            </p:nvPr>
+          </p:nvSpPr>
+          <p:spPr>
+            <a:xfrm>
+              <a:off x="10371666" y="3589867"/>
+              <a:ext cx="1817159" cy="3268133"/>
+            </a:xfrm>
+            <a:prstGeom prst="triangle">
+              <a:avLst>
+                <a:gd name="adj" fmla="val 100000"/>
+              </a:avLst>
+            </a:prstGeom>
+            <a:solidFill>
+              <a:schemeClr val="accent1">
+                <a:alpha val="80000"/>
+              </a:schemeClr>
+            </a:solidFill>
+            <a:ln>
+              <a:noFill/>
+            </a:ln>
+            <a:effectLst/>
+          </p:spPr>
+          <p:style>
+            <a:lnRef idx="1">
+              <a:schemeClr val="accent1"/>
+            </a:lnRef>
+            <a:fillRef idx="3">
+              <a:schemeClr val="accent1"/>
+            </a:fillRef>
+            <a:effectRef idx="2">
+              <a:schemeClr val="accent1"/>
+            </a:effectRef>
+            <a:fontRef idx="minor">
+              <a:schemeClr val="lt1"/>
+            </a:fontRef>
+          </p:style>
+        </p:sp>
+        <p:sp>
+          <p:nvSpPr>
+            <p:cNvPr id="36" name="Isosceles Triangle 35">
+              <a:extLst>
+                <a:ext uri="{FF2B5EF4-FFF2-40B4-BE49-F238E27FC236}">
+                  <a16:creationId xmlns:a16="http://schemas.microsoft.com/office/drawing/2014/main" id="{C9D0B38F-2E02-4E85-99EE-73595E7C8953}"/>
+                </a:ext>
+                <a:ext uri="{C183D7F6-B498-43B3-948B-1728B52AA6E4}">
+                  <adec:decorative xmlns:adec="http://schemas.microsoft.com/office/drawing/2017/decorative" val="1"/>
+                </a:ext>
+              </a:extLst>
+            </p:cNvPr>
+            <p:cNvSpPr/>
+            <p:nvPr>
+              <p:extLst>
+                <p:ext uri="{386F3935-93C4-4BCD-93E2-E3B085C9AB24}">
+                  <p16:designElem xmlns:p16="http://schemas.microsoft.com/office/powerpoint/2015/main" val="1"/>
+                </p:ext>
+              </p:extLst>
+            </p:nvPr>
+          </p:nvSpPr>
+          <p:spPr>
+            <a:xfrm rot="10800000">
+              <a:off x="0" y="0"/>
+              <a:ext cx="842596" cy="5666154"/>
+            </a:xfrm>
+            <a:prstGeom prst="triangle">
+              <a:avLst>
+                <a:gd name="adj" fmla="val 100000"/>
+              </a:avLst>
+            </a:prstGeom>
+            <a:solidFill>
+              <a:schemeClr val="accent1">
+                <a:alpha val="85000"/>
+              </a:schemeClr>
+            </a:solidFill>
+            <a:ln>
+              <a:noFill/>
+            </a:ln>
+            <a:effectLst/>
+          </p:spPr>
+          <p:style>
+            <a:lnRef idx="1">
+              <a:schemeClr val="accent1"/>
+            </a:lnRef>
+            <a:fillRef idx="3">
+              <a:schemeClr val="accent1"/>
+            </a:fillRef>
+            <a:effectRef idx="2">
+              <a:schemeClr val="accent1"/>
+            </a:effectRef>
+            <a:fontRef idx="minor">
+              <a:schemeClr val="lt1"/>
+            </a:fontRef>
+          </p:style>
+        </p:sp>
+      </p:grpSp>
       <p:sp>
         <p:nvSpPr>
           <p:cNvPr id="2" name="Title 1">
@@ -12622,25 +13911,66 @@
         </p:nvSpPr>
         <p:spPr>
           <a:xfrm>
-            <a:off x="902621" y="2768600"/>
-            <a:ext cx="8596668" cy="1320800"/>
+            <a:off x="890423" y="835017"/>
+            <a:ext cx="3742675" cy="3215820"/>
           </a:xfrm>
         </p:spPr>
         <p:txBody>
-          <a:bodyPr/>
+          <a:bodyPr vert="horz" lIns="91440" tIns="45720" rIns="91440" bIns="45720" rtlCol="0" anchor="b">
+            <a:normAutofit/>
+          </a:bodyPr>
           <a:lstStyle/>
           <a:p>
-            <a:r>
-              <a:rPr lang="en-US" dirty="0"/>
-              <a:t> </a:t>
-            </a:r>
-            <a:r>
-              <a:rPr lang="en-US" sz="2800" dirty="0"/>
-              <a:t>International Day of Happiness on March 20th</a:t>
-            </a:r>
-          </a:p>
-        </p:txBody>
-      </p:sp>
+            <a:pPr>
+              <a:lnSpc>
+                <a:spcPct val="90000"/>
+              </a:lnSpc>
+            </a:pPr>
+            <a:r>
+              <a:rPr lang="en-US" sz="4200"/>
+              <a:t> International Day of Happiness is on March 20</a:t>
+            </a:r>
+            <a:r>
+              <a:rPr lang="en-US" sz="4200" baseline="30000"/>
+              <a:t>th</a:t>
+            </a:r>
+            <a:r>
+              <a:rPr lang="en-US" sz="4200"/>
+              <a:t>.</a:t>
+            </a:r>
+          </a:p>
+        </p:txBody>
+      </p:sp>
+      <p:pic>
+        <p:nvPicPr>
+          <p:cNvPr id="7" name="Picture 6" descr="A picture containing sky, grass, outdoor, standing&#10;&#10;Description automatically generated">
+            <a:extLst>
+              <a:ext uri="{FF2B5EF4-FFF2-40B4-BE49-F238E27FC236}">
+                <a16:creationId xmlns:a16="http://schemas.microsoft.com/office/drawing/2014/main" id="{95C2DD35-873C-463E-8B49-CE2848BF4355}"/>
+              </a:ext>
+            </a:extLst>
+          </p:cNvPr>
+          <p:cNvPicPr>
+            <a:picLocks noChangeAspect="1"/>
+          </p:cNvPicPr>
+          <p:nvPr/>
+        </p:nvPicPr>
+        <p:blipFill>
+          <a:blip r:embed="rId2"/>
+          <a:stretch>
+            <a:fillRect/>
+          </a:stretch>
+        </p:blipFill>
+        <p:spPr>
+          <a:xfrm>
+            <a:off x="4861698" y="954529"/>
+            <a:ext cx="4431296" cy="2747403"/>
+          </a:xfrm>
+          <a:prstGeom prst="rect">
+            <a:avLst/>
+          </a:prstGeom>
+        </p:spPr>
+      </p:pic>
       <p:sp>
         <p:nvSpPr>
           <p:cNvPr id="3" name="Date Placeholder 2">
@@ -12657,19 +13987,60 @@
             <p:ph type="dt" sz="half" idx="10"/>
           </p:nvPr>
         </p:nvSpPr>
-        <p:spPr/>
-        <p:txBody>
-          <a:bodyPr/>
+        <p:spPr>
+          <a:xfrm>
+            <a:off x="6094411" y="6041362"/>
+            <a:ext cx="2022661" cy="365125"/>
+          </a:xfrm>
+        </p:spPr>
+        <p:txBody>
+          <a:bodyPr vert="horz" lIns="91440" tIns="45720" rIns="91440" bIns="45720" rtlCol="0" anchor="ctr">
+            <a:normAutofit/>
+          </a:bodyPr>
           <a:lstStyle/>
           <a:p>
+            <a:pPr defTabSz="914400">
+              <a:spcAft>
+                <a:spcPts val="600"/>
+              </a:spcAft>
+            </a:pPr>
             <a:r>
               <a:rPr lang="en-US"/>
               <a:t>7/29/2019</a:t>
             </a:r>
-            <a:endParaRPr lang="en-US" dirty="0"/>
-          </a:p>
-        </p:txBody>
-      </p:sp>
+          </a:p>
+        </p:txBody>
+      </p:sp>
+      <p:pic>
+        <p:nvPicPr>
+          <p:cNvPr id="6" name="Picture 5" descr="A picture containing indoor&#10;&#10;Description automatically generated">
+            <a:extLst>
+              <a:ext uri="{FF2B5EF4-FFF2-40B4-BE49-F238E27FC236}">
+                <a16:creationId xmlns:a16="http://schemas.microsoft.com/office/drawing/2014/main" id="{A06A61C2-1669-41D5-80AE-443A7F734494}"/>
+              </a:ext>
+            </a:extLst>
+          </p:cNvPr>
+          <p:cNvPicPr>
+            <a:picLocks noChangeAspect="1"/>
+          </p:cNvPicPr>
+          <p:nvPr/>
+        </p:nvPicPr>
+        <p:blipFill>
+          <a:blip r:embed="rId3"/>
+          <a:stretch>
+            <a:fillRect/>
+          </a:stretch>
+        </p:blipFill>
+        <p:spPr>
+          <a:xfrm>
+            <a:off x="4861698" y="4329406"/>
+            <a:ext cx="2101348" cy="1434169"/>
+          </a:xfrm>
+          <a:prstGeom prst="rect">
+            <a:avLst/>
+          </a:prstGeom>
+        </p:spPr>
+      </p:pic>
       <p:sp>
         <p:nvSpPr>
           <p:cNvPr id="4" name="Slide Number Placeholder 3">
@@ -12686,20 +14057,66 @@
             <p:ph type="sldNum" sz="quarter" idx="12"/>
           </p:nvPr>
         </p:nvSpPr>
-        <p:spPr/>
-        <p:txBody>
-          <a:bodyPr/>
+        <p:spPr>
+          <a:xfrm>
+            <a:off x="8590663" y="6041362"/>
+            <a:ext cx="683339" cy="365125"/>
+          </a:xfrm>
+        </p:spPr>
+        <p:txBody>
+          <a:bodyPr vert="horz" lIns="91440" tIns="45720" rIns="91440" bIns="45720" rtlCol="0" anchor="ctr">
+            <a:normAutofit/>
+          </a:bodyPr>
           <a:lstStyle/>
           <a:p>
+            <a:pPr defTabSz="914400">
+              <a:spcAft>
+                <a:spcPts val="600"/>
+              </a:spcAft>
+            </a:pPr>
             <a:fld id="{D57F1E4F-1CFF-5643-939E-217C01CDF565}" type="slidenum">
               <a:rPr lang="en-US" smtClean="0"/>
-              <a:pPr/>
+              <a:pPr defTabSz="914400">
+                <a:spcAft>
+                  <a:spcPts val="600"/>
+                </a:spcAft>
+              </a:pPr>
               <a:t>24</a:t>
             </a:fld>
-            <a:endParaRPr lang="en-US" dirty="0"/>
-          </a:p>
-        </p:txBody>
-      </p:sp>
+            <a:endParaRPr lang="en-US"/>
+          </a:p>
+        </p:txBody>
+      </p:sp>
+      <p:pic>
+        <p:nvPicPr>
+          <p:cNvPr id="8" name="Picture 7" descr="A picture containing oranges, cut, half, little&#10;&#10;Description automatically generated">
+            <a:extLst>
+              <a:ext uri="{FF2B5EF4-FFF2-40B4-BE49-F238E27FC236}">
+                <a16:creationId xmlns:a16="http://schemas.microsoft.com/office/drawing/2014/main" id="{D4C468B5-E11D-4F1D-A430-DEA1AEF7542A}"/>
+              </a:ext>
+            </a:extLst>
+          </p:cNvPr>
+          <p:cNvPicPr>
+            <a:picLocks noChangeAspect="1"/>
+          </p:cNvPicPr>
+          <p:nvPr/>
+        </p:nvPicPr>
+        <p:blipFill>
+          <a:blip r:embed="rId4"/>
+          <a:stretch>
+            <a:fillRect/>
+          </a:stretch>
+        </p:blipFill>
+        <p:spPr>
+          <a:xfrm>
+            <a:off x="7191646" y="4387193"/>
+            <a:ext cx="2101348" cy="1318595"/>
+          </a:xfrm>
+          <a:prstGeom prst="rect">
+            <a:avLst/>
+          </a:prstGeom>
+        </p:spPr>
+      </p:pic>
     </p:spTree>
     <p:extLst>
       <p:ext uri="{BB962C8B-B14F-4D97-AF65-F5344CB8AC3E}">
@@ -13373,7 +14790,12 @@
             <p:ph type="title"/>
           </p:nvPr>
         </p:nvSpPr>
-        <p:spPr/>
+        <p:spPr>
+          <a:xfrm>
+            <a:off x="677334" y="609600"/>
+            <a:ext cx="8596668" cy="825500"/>
+          </a:xfrm>
+        </p:spPr>
         <p:txBody>
           <a:bodyPr/>
           <a:lstStyle/>
@@ -13401,7 +14823,12 @@
             <p:ph idx="1"/>
           </p:nvPr>
         </p:nvSpPr>
-        <p:spPr/>
+        <p:spPr>
+          <a:xfrm>
+            <a:off x="677334" y="1797844"/>
+            <a:ext cx="8596668" cy="3880773"/>
+          </a:xfrm>
+        </p:spPr>
         <p:txBody>
           <a:bodyPr/>
           <a:lstStyle/>

</xml_diff>